<commit_message>
Updated the workflow figure
</commit_message>
<xml_diff>
--- a/workflow.pptx
+++ b/workflow.pptx
@@ -7728,7 +7728,7 @@
             <p:spPr>
               <a:xfrm>
                 <a:off x="89890" y="194418"/>
-                <a:ext cx="2136240" cy="492443"/>
+                <a:ext cx="2136240" cy="553998"/>
               </a:xfrm>
               <a:prstGeom prst="rect">
                 <a:avLst/>
@@ -7743,14 +7743,14 @@
               <a:p>
                 <a:pPr algn="ctr"/>
                 <a:r>
-                  <a:rPr lang="en-US" sz="2600" dirty="0" smtClean="0">
+                  <a:rPr lang="en-US" sz="3000" dirty="0" smtClean="0">
                     <a:solidFill>
                       <a:srgbClr val="238B45"/>
                     </a:solidFill>
                   </a:rPr>
                   <a:t>XCT Data</a:t>
                 </a:r>
-                <a:endParaRPr lang="en-US" sz="2600" dirty="0">
+                <a:endParaRPr lang="en-US" sz="3000" dirty="0">
                   <a:solidFill>
                     <a:srgbClr val="238B45"/>
                   </a:solidFill>

</xml_diff>